<commit_message>
Update from 09/16 Meeting
</commit_message>
<xml_diff>
--- a/Presentations/656_Project_Slides.pptx
+++ b/Presentations/656_Project_Slides.pptx
@@ -7456,8 +7456,8 @@
         </p:nvGrpSpPr>
         <p:grpSpPr>
           <a:xfrm>
-            <a:off x="437825" y="1568589"/>
-            <a:ext cx="2685450" cy="3086700"/>
+            <a:off x="437825" y="600701"/>
+            <a:ext cx="2999518" cy="4054588"/>
             <a:chOff x="437825" y="1568589"/>
             <a:chExt cx="2685450" cy="3086700"/>
           </a:xfrm>
@@ -7579,8 +7579,8 @@
         </p:nvSpPr>
         <p:spPr>
           <a:xfrm>
-            <a:off x="509525" y="2071925"/>
-            <a:ext cx="2494500" cy="2563800"/>
+            <a:off x="509524" y="1221426"/>
+            <a:ext cx="2861075" cy="3414300"/>
           </a:xfrm>
           <a:prstGeom prst="rect">
             <a:avLst/>
@@ -7854,6 +7854,36 @@
             <a:pPr marL="0" indent="0">
               <a:buNone/>
             </a:pPr>
+            <a:endParaRPr lang="en-US" sz="700" b="1" dirty="0"/>
+          </a:p>
+          <a:p>
+            <a:pPr marL="0" indent="0">
+              <a:buNone/>
+            </a:pPr>
+            <a:r>
+              <a:rPr lang="en-US" sz="700" b="1" dirty="0"/>
+              <a:t>What are the relationships between park visitation and climate, socioeconomic factors, and park information?</a:t>
+            </a:r>
+          </a:p>
+          <a:p>
+            <a:pPr marL="0" indent="0">
+              <a:buNone/>
+            </a:pPr>
+            <a:endParaRPr lang="en-US" sz="700" b="1" dirty="0"/>
+          </a:p>
+          <a:p>
+            <a:pPr marL="0" indent="0">
+              <a:buNone/>
+            </a:pPr>
+            <a:r>
+              <a:rPr lang="en-US" sz="700" b="1" dirty="0"/>
+              <a:t>We want to, given the observed trend in park attendance across months/years, model the relationships between climate and socioeconomic factors, and park visitations.</a:t>
+            </a:r>
+          </a:p>
+          <a:p>
+            <a:pPr marL="0" indent="0">
+              <a:buNone/>
+            </a:pPr>
             <a:endParaRPr lang="en-US" sz="700" dirty="0"/>
           </a:p>
           <a:p>
@@ -7864,6 +7894,33 @@
               <a:rPr lang="en-US" sz="700" dirty="0"/>
               <a:t>- Explain the concept in simple language.  Be on the lookout for moments in which you use terminology from this class.  Seek to use the definition instead.  Include a very simple example demonstrating the underlying idea.</a:t>
             </a:r>
+          </a:p>
+          <a:p>
+            <a:pPr marL="0" indent="0">
+              <a:buNone/>
+            </a:pPr>
+            <a:endParaRPr lang="en-US" sz="700" dirty="0"/>
+          </a:p>
+          <a:p>
+            <a:pPr marL="0" indent="0">
+              <a:buNone/>
+            </a:pPr>
+            <a:r>
+              <a:rPr lang="en-US" sz="700" b="1" dirty="0"/>
+              <a:t>Aubrey – Bullets for business problem to solve and steps to address</a:t>
+            </a:r>
+          </a:p>
+          <a:p>
+            <a:pPr marL="0" indent="0">
+              <a:buNone/>
+            </a:pPr>
+            <a:endParaRPr lang="en-US" sz="700" b="1" dirty="0"/>
+          </a:p>
+          <a:p>
+            <a:pPr marL="0" indent="0">
+              <a:buNone/>
+            </a:pPr>
+            <a:endParaRPr lang="en-US" sz="700" b="1" dirty="0"/>
           </a:p>
           <a:p>
             <a:pPr marL="0" indent="0">

</xml_diff>

<commit_message>
Beau Adding slide for Feynman
</commit_message>
<xml_diff>
--- a/Presentations/656_Project_Slides.pptx
+++ b/Presentations/656_Project_Slides.pptx
@@ -7579,8 +7579,8 @@
         </p:nvSpPr>
         <p:spPr>
           <a:xfrm>
-            <a:off x="509524" y="1221426"/>
-            <a:ext cx="2861075" cy="3414300"/>
+            <a:off x="509524" y="1221425"/>
+            <a:ext cx="2861075" cy="3606149"/>
           </a:xfrm>
           <a:prstGeom prst="rect">
             <a:avLst/>

</xml_diff>